<commit_message>
Update with diamond shape
</commit_message>
<xml_diff>
--- a/Coursework2/Code demo.pptx
+++ b/Coursework2/Code demo.pptx
@@ -110,11 +110,6 @@
       </a:defRPr>
     </a:lvl9pPr>
   </p:defaultTextStyle>
-  <p:extLst>
-    <p:ext uri="{EFAFB233-063F-42B5-8137-9DF3F51BA10A}">
-      <p15:sldGuideLst xmlns:p15="http://schemas.microsoft.com/office/powerpoint/2012/main"/>
-    </p:ext>
-  </p:extLst>
 </p:presentation>
 </file>
 
@@ -620,7 +615,7 @@
           <a:p>
             <a:fld id="{46737D0F-E17E-4A1B-843C-FBFEAD658352}" type="datetimeFigureOut">
               <a:rPr lang="en-GB" smtClean="0"/>
-              <a:t>11/12/2017</a:t>
+              <a:t>10/12/2017</a:t>
             </a:fld>
             <a:endParaRPr lang="en-GB"/>
           </a:p>
@@ -916,7 +911,7 @@
           <a:p>
             <a:fld id="{46737D0F-E17E-4A1B-843C-FBFEAD658352}" type="datetimeFigureOut">
               <a:rPr lang="en-GB" smtClean="0"/>
-              <a:t>11/12/2017</a:t>
+              <a:t>10/12/2017</a:t>
             </a:fld>
             <a:endParaRPr lang="en-GB"/>
           </a:p>
@@ -1164,7 +1159,7 @@
           <a:p>
             <a:fld id="{46737D0F-E17E-4A1B-843C-FBFEAD658352}" type="datetimeFigureOut">
               <a:rPr lang="en-GB" smtClean="0"/>
-              <a:t>11/12/2017</a:t>
+              <a:t>10/12/2017</a:t>
             </a:fld>
             <a:endParaRPr lang="en-GB"/>
           </a:p>
@@ -1704,7 +1699,7 @@
           <a:p>
             <a:fld id="{46737D0F-E17E-4A1B-843C-FBFEAD658352}" type="datetimeFigureOut">
               <a:rPr lang="en-GB" smtClean="0"/>
-              <a:t>11/12/2017</a:t>
+              <a:t>10/12/2017</a:t>
             </a:fld>
             <a:endParaRPr lang="en-GB"/>
           </a:p>
@@ -1952,7 +1947,7 @@
           <a:p>
             <a:fld id="{46737D0F-E17E-4A1B-843C-FBFEAD658352}" type="datetimeFigureOut">
               <a:rPr lang="en-GB" smtClean="0"/>
-              <a:t>11/12/2017</a:t>
+              <a:t>10/12/2017</a:t>
             </a:fld>
             <a:endParaRPr lang="en-GB"/>
           </a:p>
@@ -2484,7 +2479,7 @@
           <a:p>
             <a:fld id="{46737D0F-E17E-4A1B-843C-FBFEAD658352}" type="datetimeFigureOut">
               <a:rPr lang="en-GB" smtClean="0"/>
-              <a:t>11/12/2017</a:t>
+              <a:t>10/12/2017</a:t>
             </a:fld>
             <a:endParaRPr lang="en-GB"/>
           </a:p>
@@ -2781,7 +2776,7 @@
           <a:p>
             <a:fld id="{46737D0F-E17E-4A1B-843C-FBFEAD658352}" type="datetimeFigureOut">
               <a:rPr lang="en-GB" smtClean="0"/>
-              <a:t>11/12/2017</a:t>
+              <a:t>10/12/2017</a:t>
             </a:fld>
             <a:endParaRPr lang="en-GB"/>
           </a:p>
@@ -2955,7 +2950,7 @@
           <a:p>
             <a:fld id="{46737D0F-E17E-4A1B-843C-FBFEAD658352}" type="datetimeFigureOut">
               <a:rPr lang="en-GB" smtClean="0"/>
-              <a:t>11/12/2017</a:t>
+              <a:t>10/12/2017</a:t>
             </a:fld>
             <a:endParaRPr lang="en-GB"/>
           </a:p>
@@ -3135,7 +3130,7 @@
           <a:p>
             <a:fld id="{46737D0F-E17E-4A1B-843C-FBFEAD658352}" type="datetimeFigureOut">
               <a:rPr lang="en-GB" smtClean="0"/>
-              <a:t>11/12/2017</a:t>
+              <a:t>10/12/2017</a:t>
             </a:fld>
             <a:endParaRPr lang="en-GB"/>
           </a:p>
@@ -3305,7 +3300,7 @@
           <a:p>
             <a:fld id="{46737D0F-E17E-4A1B-843C-FBFEAD658352}" type="datetimeFigureOut">
               <a:rPr lang="en-GB" smtClean="0"/>
-              <a:t>11/12/2017</a:t>
+              <a:t>10/12/2017</a:t>
             </a:fld>
             <a:endParaRPr lang="en-GB"/>
           </a:p>
@@ -3556,7 +3551,7 @@
           <a:p>
             <a:fld id="{46737D0F-E17E-4A1B-843C-FBFEAD658352}" type="datetimeFigureOut">
               <a:rPr lang="en-GB" smtClean="0"/>
-              <a:t>11/12/2017</a:t>
+              <a:t>10/12/2017</a:t>
             </a:fld>
             <a:endParaRPr lang="en-GB"/>
           </a:p>
@@ -3853,7 +3848,7 @@
           <a:p>
             <a:fld id="{46737D0F-E17E-4A1B-843C-FBFEAD658352}" type="datetimeFigureOut">
               <a:rPr lang="en-GB" smtClean="0"/>
-              <a:t>11/12/2017</a:t>
+              <a:t>10/12/2017</a:t>
             </a:fld>
             <a:endParaRPr lang="en-GB"/>
           </a:p>
@@ -4295,7 +4290,7 @@
           <a:p>
             <a:fld id="{46737D0F-E17E-4A1B-843C-FBFEAD658352}" type="datetimeFigureOut">
               <a:rPr lang="en-GB" smtClean="0"/>
-              <a:t>11/12/2017</a:t>
+              <a:t>10/12/2017</a:t>
             </a:fld>
             <a:endParaRPr lang="en-GB"/>
           </a:p>
@@ -4413,7 +4408,7 @@
           <a:p>
             <a:fld id="{46737D0F-E17E-4A1B-843C-FBFEAD658352}" type="datetimeFigureOut">
               <a:rPr lang="en-GB" smtClean="0"/>
-              <a:t>11/12/2017</a:t>
+              <a:t>10/12/2017</a:t>
             </a:fld>
             <a:endParaRPr lang="en-GB"/>
           </a:p>
@@ -4508,7 +4503,7 @@
           <a:p>
             <a:fld id="{46737D0F-E17E-4A1B-843C-FBFEAD658352}" type="datetimeFigureOut">
               <a:rPr lang="en-GB" smtClean="0"/>
-              <a:t>11/12/2017</a:t>
+              <a:t>10/12/2017</a:t>
             </a:fld>
             <a:endParaRPr lang="en-GB"/>
           </a:p>
@@ -4791,7 +4786,7 @@
           <a:p>
             <a:fld id="{46737D0F-E17E-4A1B-843C-FBFEAD658352}" type="datetimeFigureOut">
               <a:rPr lang="en-GB" smtClean="0"/>
-              <a:t>11/12/2017</a:t>
+              <a:t>10/12/2017</a:t>
             </a:fld>
             <a:endParaRPr lang="en-GB"/>
           </a:p>
@@ -5082,7 +5077,7 @@
           <a:p>
             <a:fld id="{46737D0F-E17E-4A1B-843C-FBFEAD658352}" type="datetimeFigureOut">
               <a:rPr lang="en-GB" smtClean="0"/>
-              <a:t>11/12/2017</a:t>
+              <a:t>10/12/2017</a:t>
             </a:fld>
             <a:endParaRPr lang="en-GB"/>
           </a:p>
@@ -5612,7 +5607,7 @@
           <a:p>
             <a:fld id="{46737D0F-E17E-4A1B-843C-FBFEAD658352}" type="datetimeFigureOut">
               <a:rPr lang="en-GB" smtClean="0"/>
-              <a:t>11/12/2017</a:t>
+              <a:t>10/12/2017</a:t>
             </a:fld>
             <a:endParaRPr lang="en-GB"/>
           </a:p>
@@ -6155,7 +6150,7 @@
         </p:nvSpPr>
         <p:spPr>
           <a:xfrm>
-            <a:off x="-128789" y="645973"/>
+            <a:off x="0" y="942187"/>
             <a:ext cx="8574622" cy="2616199"/>
           </a:xfrm>
         </p:spPr>
@@ -6168,42 +6163,6 @@
               <a:t>Code demo</a:t>
             </a:r>
             <a:endParaRPr lang="en-GB" dirty="0"/>
-          </a:p>
-        </p:txBody>
-      </p:sp>
-      <p:sp>
-        <p:nvSpPr>
-          <p:cNvPr id="3" name="TextBox 2"/>
-          <p:cNvSpPr txBox="1"/>
-          <p:nvPr/>
-        </p:nvSpPr>
-        <p:spPr>
-          <a:xfrm>
-            <a:off x="4700789" y="3493991"/>
-            <a:ext cx="4082602" cy="830997"/>
-          </a:xfrm>
-          <a:prstGeom prst="rect">
-            <a:avLst/>
-          </a:prstGeom>
-          <a:noFill/>
-        </p:spPr>
-        <p:txBody>
-          <a:bodyPr wrap="square" rtlCol="0">
-            <a:spAutoFit/>
-          </a:bodyPr>
-          <a:lstStyle/>
-          <a:p>
-            <a:r>
-              <a:rPr lang="en-GB" sz="2400" dirty="0" smtClean="0"/>
-              <a:t>Sami Jones</a:t>
-            </a:r>
-          </a:p>
-          <a:p>
-            <a:r>
-              <a:rPr lang="en-GB" sz="2400" dirty="0" smtClean="0"/>
-              <a:t>14009730</a:t>
-            </a:r>
-            <a:endParaRPr lang="en-GB" sz="2400" dirty="0"/>
           </a:p>
         </p:txBody>
       </p:sp>

</xml_diff>